<commit_message>
Continuing working on events in day detail
</commit_message>
<xml_diff>
--- a/01-Documentation/Report/Projet 3ème.pptx
+++ b/01-Documentation/Report/Projet 3ème.pptx
@@ -5,7 +5,7 @@
     <p:sldMasterId id="2147483648" r:id="rId1"/>
   </p:sldMasterIdLst>
   <p:notesMasterIdLst>
-    <p:notesMasterId r:id="rId18"/>
+    <p:notesMasterId r:id="rId15"/>
   </p:notesMasterIdLst>
   <p:sldIdLst>
     <p:sldId id="256" r:id="rId2"/>
@@ -17,13 +17,10 @@
     <p:sldId id="265" r:id="rId8"/>
     <p:sldId id="266" r:id="rId9"/>
     <p:sldId id="259" r:id="rId10"/>
-    <p:sldId id="267" r:id="rId11"/>
-    <p:sldId id="270" r:id="rId12"/>
-    <p:sldId id="271" r:id="rId13"/>
-    <p:sldId id="272" r:id="rId14"/>
-    <p:sldId id="260" r:id="rId15"/>
-    <p:sldId id="273" r:id="rId16"/>
-    <p:sldId id="261" r:id="rId17"/>
+    <p:sldId id="260" r:id="rId11"/>
+    <p:sldId id="273" r:id="rId12"/>
+    <p:sldId id="275" r:id="rId13"/>
+    <p:sldId id="261" r:id="rId14"/>
   </p:sldIdLst>
   <p:sldSz cx="12192000" cy="6858000"/>
   <p:notesSz cx="6858000" cy="9144000"/>
@@ -122,6 +119,14 @@
       </a:defRPr>
     </a:lvl9pPr>
   </p:defaultTextStyle>
+  <p:extLst>
+    <p:ext uri="{EFAFB233-063F-42B5-8137-9DF3F51BA10A}">
+      <p15:sldGuideLst xmlns:p15="http://schemas.microsoft.com/office/powerpoint/2012/main"/>
+    </p:ext>
+    <p:ext uri="{2D200454-40CA-4A62-9FC3-DE9A4176ACB9}">
+      <p15:notesGuideLst xmlns:p15="http://schemas.microsoft.com/office/powerpoint/2012/main"/>
+    </p:ext>
+  </p:extLst>
 </p:presentation>
 </file>
 
@@ -207,7 +212,7 @@
           <a:p>
             <a:fld id="{8EA73CFB-B723-4A07-800C-BFDDB5D4560A}" type="datetimeFigureOut">
               <a:rPr lang="fr-CH" smtClean="0"/>
-              <a:t>09.01.2020</a:t>
+              <a:t>24.01.2020</a:t>
             </a:fld>
             <a:endParaRPr lang="fr-CH"/>
           </a:p>
@@ -540,7 +545,7 @@
           <a:p>
             <a:fld id="{AF20F4FC-321E-488B-B931-F783E76E6992}" type="slidenum">
               <a:rPr lang="fr-CH" smtClean="0"/>
-              <a:t>2</a:t>
+              <a:t>1</a:t>
             </a:fld>
             <a:endParaRPr lang="fr-CH"/>
           </a:p>
@@ -549,7 +554,7 @@
     </p:spTree>
     <p:extLst>
       <p:ext uri="{BB962C8B-B14F-4D97-AF65-F5344CB8AC3E}">
-        <p14:creationId xmlns:p14="http://schemas.microsoft.com/office/powerpoint/2010/main" val="3680644226"/>
+        <p14:creationId xmlns:p14="http://schemas.microsoft.com/office/powerpoint/2010/main" val="3324799870"/>
       </p:ext>
     </p:extLst>
   </p:cSld>
@@ -603,99 +608,7 @@
           <a:bodyPr/>
           <a:lstStyle/>
           <a:p>
-            <a:r>
-              <a:rPr lang="fr-CH" dirty="0"/>
-              <a:t>développement d’une application ou recherche d’un outils déjà existant, permettant de gérer</a:t>
-            </a:r>
-            <a:br>
-              <a:rPr lang="fr-CH" dirty="0"/>
-            </a:br>
-            <a:r>
-              <a:rPr lang="fr-CH" dirty="0"/>
-              <a:t>les inscriptions à différentes activités se déroulant soit simultanément soit séquentiellement.</a:t>
-            </a:r>
-            <a:r>
-              <a:rPr lang="fr-CH" dirty="0" smtClean="0"/>
-              <a:t> </a:t>
-            </a:r>
-          </a:p>
-          <a:p>
-            <a:r>
-              <a:rPr lang="fr-CH" dirty="0" smtClean="0"/>
-              <a:t>Journée pédagogique</a:t>
-            </a:r>
-            <a:endParaRPr lang="fr-CH" dirty="0"/>
-          </a:p>
-          <a:p>
-            <a:r>
-              <a:rPr lang="fr-CH" dirty="0" smtClean="0"/>
-              <a:t/>
-            </a:r>
-            <a:br>
-              <a:rPr lang="fr-CH" dirty="0" smtClean="0"/>
-            </a:br>
-            <a:r>
-              <a:rPr lang="fr-CH" dirty="0" smtClean="0"/>
-              <a:t>Le résultat du projet sera utilisé par un client réel</a:t>
-            </a:r>
-          </a:p>
-          <a:p>
-            <a:endParaRPr lang="fr-CH" dirty="0"/>
-          </a:p>
-          <a:p>
-            <a:r>
-              <a:rPr lang="fr-CH" dirty="0" smtClean="0"/>
-              <a:t>Fonctionnalités requises : </a:t>
-            </a:r>
-          </a:p>
-          <a:p>
-            <a:endParaRPr lang="fr-CH" dirty="0"/>
-          </a:p>
-          <a:p>
-            <a:pPr marL="228600" indent="-228600">
-              <a:buAutoNum type="arabicPeriod"/>
-            </a:pPr>
-            <a:r>
-              <a:rPr lang="fr-CH" dirty="0" smtClean="0"/>
-              <a:t>Gestion des inscriptions dynamique </a:t>
-            </a:r>
-          </a:p>
-          <a:p>
-            <a:pPr marL="228600" indent="-228600">
-              <a:buAutoNum type="arabicPeriod"/>
-            </a:pPr>
-            <a:r>
-              <a:rPr lang="fr-CH" dirty="0" smtClean="0"/>
-              <a:t>Plusieurs évènements dans même temps</a:t>
-            </a:r>
-          </a:p>
-          <a:p>
-            <a:pPr marL="228600" indent="-228600">
-              <a:buAutoNum type="arabicPeriod"/>
-            </a:pPr>
-            <a:r>
-              <a:rPr lang="fr-CH" dirty="0" smtClean="0"/>
-              <a:t>Création des jours des activités</a:t>
-            </a:r>
-          </a:p>
-          <a:p>
-            <a:pPr marL="228600" indent="-228600">
-              <a:buAutoNum type="arabicPeriod"/>
-            </a:pPr>
-            <a:r>
-              <a:rPr lang="fr-CH" dirty="0" smtClean="0"/>
-              <a:t>Affichage sous forme de Doodle pour les administrateurs</a:t>
-            </a:r>
-          </a:p>
-          <a:p>
-            <a:pPr marL="228600" indent="-228600">
-              <a:buAutoNum type="arabicPeriod"/>
-            </a:pPr>
-            <a:r>
-              <a:rPr lang="fr-CH" dirty="0" smtClean="0"/>
-              <a:t>Exportation dans un fichier Excel</a:t>
-            </a:r>
-            <a:endParaRPr lang="fr-CH" dirty="0"/>
+            <a:endParaRPr lang="fr-CH"/>
           </a:p>
         </p:txBody>
       </p:sp>
@@ -716,7 +629,7 @@
           <a:p>
             <a:fld id="{AF20F4FC-321E-488B-B931-F783E76E6992}" type="slidenum">
               <a:rPr lang="fr-CH" smtClean="0"/>
-              <a:t>3</a:t>
+              <a:t>2</a:t>
             </a:fld>
             <a:endParaRPr lang="fr-CH"/>
           </a:p>
@@ -725,7 +638,7 @@
     </p:spTree>
     <p:extLst>
       <p:ext uri="{BB962C8B-B14F-4D97-AF65-F5344CB8AC3E}">
-        <p14:creationId xmlns:p14="http://schemas.microsoft.com/office/powerpoint/2010/main" val="848606746"/>
+        <p14:creationId xmlns:p14="http://schemas.microsoft.com/office/powerpoint/2010/main" val="3680644226"/>
       </p:ext>
     </p:extLst>
   </p:cSld>
@@ -779,15 +692,49 @@
           <a:bodyPr/>
           <a:lstStyle/>
           <a:p>
-            <a:endParaRPr lang="fr-CH" dirty="0" smtClean="0"/>
-          </a:p>
-          <a:p>
+            <a:r>
+              <a:rPr lang="fr-CH" dirty="0"/>
+              <a:t>développement d’une application ou recherche d’un outils déjà existant, permettant de gérer</a:t>
+            </a:r>
+            <a:br>
+              <a:rPr lang="fr-CH" dirty="0"/>
+            </a:br>
+            <a:r>
+              <a:rPr lang="fr-CH" dirty="0"/>
+              <a:t>les inscriptions à différentes activités se déroulant soit simultanément soit séquentiellement.</a:t>
+            </a:r>
+            <a:r>
+              <a:rPr lang="fr-CH" dirty="0" smtClean="0"/>
+              <a:t> </a:t>
+            </a:r>
+          </a:p>
+          <a:p>
+            <a:r>
+              <a:rPr lang="fr-CH" dirty="0" smtClean="0"/>
+              <a:t>Journée pédagogique</a:t>
+            </a:r>
             <a:endParaRPr lang="fr-CH" dirty="0"/>
           </a:p>
           <a:p>
             <a:r>
               <a:rPr lang="fr-CH" dirty="0" smtClean="0"/>
-              <a:t>A partir de fonctionnalités demandées j’ai décidé de réaliser</a:t>
+              <a:t/>
+            </a:r>
+            <a:br>
+              <a:rPr lang="fr-CH" dirty="0" smtClean="0"/>
+            </a:br>
+            <a:r>
+              <a:rPr lang="fr-CH" dirty="0" smtClean="0"/>
+              <a:t>Le résultat du projet sera utilisé par un client réel</a:t>
+            </a:r>
+          </a:p>
+          <a:p>
+            <a:endParaRPr lang="fr-CH" dirty="0"/>
+          </a:p>
+          <a:p>
+            <a:r>
+              <a:rPr lang="fr-CH" dirty="0" smtClean="0"/>
+              <a:t>Fonctionnalités requises : </a:t>
             </a:r>
           </a:p>
           <a:p>
@@ -799,14 +746,17 @@
             </a:pPr>
             <a:r>
               <a:rPr lang="fr-CH" dirty="0" smtClean="0"/>
-              <a:t>Une BD –&gt; Evident -&gt; stockage des utilisateurs et évènements</a:t>
+              <a:t>Gestion des inscriptions dynamique </a:t>
             </a:r>
           </a:p>
           <a:p>
             <a:pPr marL="228600" indent="-228600">
               <a:buAutoNum type="arabicPeriod"/>
             </a:pPr>
-            <a:endParaRPr lang="fr-CH" dirty="0" smtClean="0"/>
+            <a:r>
+              <a:rPr lang="fr-CH" dirty="0" smtClean="0"/>
+              <a:t>Plusieurs évènements dans même temps</a:t>
+            </a:r>
           </a:p>
           <a:p>
             <a:pPr marL="228600" indent="-228600">
@@ -814,7 +764,7 @@
             </a:pPr>
             <a:r>
               <a:rPr lang="fr-CH" dirty="0" smtClean="0"/>
-              <a:t>Un site web – plus simple à utiliser qu’une application Windows ou application mobile, c’est universelle</a:t>
+              <a:t>Création des jours des activités</a:t>
             </a:r>
           </a:p>
           <a:p>
@@ -823,23 +773,7 @@
             </a:pPr>
             <a:r>
               <a:rPr lang="fr-CH" dirty="0" smtClean="0"/>
-              <a:t>D’</a:t>
-            </a:r>
-            <a:r>
-              <a:rPr lang="fr-CH" dirty="0" err="1" smtClean="0"/>
-              <a:t>abbord</a:t>
-            </a:r>
-            <a:r>
-              <a:rPr lang="fr-CH" dirty="0" smtClean="0"/>
-              <a:t> j’ai essayé d’utiliser langage Ruby et </a:t>
-            </a:r>
-            <a:r>
-              <a:rPr lang="fr-CH" dirty="0" smtClean="0"/>
-              <a:t>Framework </a:t>
-            </a:r>
-            <a:r>
-              <a:rPr lang="fr-CH" dirty="0" smtClean="0"/>
-              <a:t>Ruby on Rails, mais j’ai compris que je n’ai pas eu assez de temps pour l’apprendre et appliquer</a:t>
+              <a:t>Affichage sous forme de Doodle pour les administrateurs</a:t>
             </a:r>
           </a:p>
           <a:p>
@@ -848,28 +782,9 @@
             </a:pPr>
             <a:r>
               <a:rPr lang="fr-CH" dirty="0" smtClean="0"/>
-              <a:t>Utilisant un Framework PHP – après quelques recherches décidé d’utiliser </a:t>
-            </a:r>
-            <a:r>
-              <a:rPr lang="fr-CH" dirty="0" err="1" smtClean="0"/>
-              <a:t>Symfony</a:t>
-            </a:r>
-            <a:endParaRPr lang="fr-CH" dirty="0" smtClean="0"/>
-          </a:p>
-          <a:p>
-            <a:endParaRPr lang="fr-CH" dirty="0" smtClean="0"/>
-          </a:p>
-          <a:p>
-            <a:r>
-              <a:rPr lang="fr-CH" dirty="0" smtClean="0"/>
-              <a:t>Planification est sous format agile, parce que je n’ai eu aucune idée combien de temps chaque tâche peut prendre.</a:t>
-            </a:r>
-          </a:p>
-          <a:p>
+              <a:t>Exportation dans un fichier Excel</a:t>
+            </a:r>
             <a:endParaRPr lang="fr-CH" dirty="0"/>
-          </a:p>
-          <a:p>
-            <a:endParaRPr lang="fr-CH" dirty="0" smtClean="0"/>
           </a:p>
         </p:txBody>
       </p:sp>
@@ -890,7 +805,7 @@
           <a:p>
             <a:fld id="{AF20F4FC-321E-488B-B931-F783E76E6992}" type="slidenum">
               <a:rPr lang="fr-CH" smtClean="0"/>
-              <a:t>9</a:t>
+              <a:t>3</a:t>
             </a:fld>
             <a:endParaRPr lang="fr-CH"/>
           </a:p>
@@ -899,7 +814,7 @@
     </p:spTree>
     <p:extLst>
       <p:ext uri="{BB962C8B-B14F-4D97-AF65-F5344CB8AC3E}">
-        <p14:creationId xmlns:p14="http://schemas.microsoft.com/office/powerpoint/2010/main" val="1631050410"/>
+        <p14:creationId xmlns:p14="http://schemas.microsoft.com/office/powerpoint/2010/main" val="848606746"/>
       </p:ext>
     </p:extLst>
   </p:cSld>
@@ -953,7 +868,89 @@
           <a:bodyPr/>
           <a:lstStyle/>
           <a:p>
-            <a:endParaRPr lang="fr-CH"/>
+            <a:endParaRPr lang="fr-CH" dirty="0" smtClean="0"/>
+          </a:p>
+          <a:p>
+            <a:endParaRPr lang="fr-CH" dirty="0"/>
+          </a:p>
+          <a:p>
+            <a:r>
+              <a:rPr lang="fr-CH" dirty="0" smtClean="0"/>
+              <a:t>A partir de fonctionnalités demandées j’ai décidé de réaliser</a:t>
+            </a:r>
+          </a:p>
+          <a:p>
+            <a:endParaRPr lang="fr-CH" dirty="0"/>
+          </a:p>
+          <a:p>
+            <a:pPr marL="228600" indent="-228600">
+              <a:buAutoNum type="arabicPeriod"/>
+            </a:pPr>
+            <a:r>
+              <a:rPr lang="fr-CH" dirty="0" smtClean="0"/>
+              <a:t>Une BD –&gt; Evident -&gt; stockage des utilisateurs et évènements</a:t>
+            </a:r>
+          </a:p>
+          <a:p>
+            <a:pPr marL="228600" indent="-228600">
+              <a:buAutoNum type="arabicPeriod"/>
+            </a:pPr>
+            <a:endParaRPr lang="fr-CH" dirty="0" smtClean="0"/>
+          </a:p>
+          <a:p>
+            <a:pPr marL="228600" indent="-228600">
+              <a:buAutoNum type="arabicPeriod"/>
+            </a:pPr>
+            <a:r>
+              <a:rPr lang="fr-CH" dirty="0" smtClean="0"/>
+              <a:t>Un site web – plus simple à utiliser qu’une application Windows ou application mobile, c’est universelle</a:t>
+            </a:r>
+          </a:p>
+          <a:p>
+            <a:pPr marL="228600" indent="-228600">
+              <a:buAutoNum type="arabicPeriod"/>
+            </a:pPr>
+            <a:r>
+              <a:rPr lang="fr-CH" dirty="0" smtClean="0"/>
+              <a:t>D’</a:t>
+            </a:r>
+            <a:r>
+              <a:rPr lang="fr-CH" dirty="0" err="1" smtClean="0"/>
+              <a:t>abbord</a:t>
+            </a:r>
+            <a:r>
+              <a:rPr lang="fr-CH" dirty="0" smtClean="0"/>
+              <a:t> j’ai essayé d’utiliser langage Ruby et Framework Ruby on Rails, mais j’ai compris que je n’ai pas eu assez de temps pour l’apprendre et appliquer</a:t>
+            </a:r>
+          </a:p>
+          <a:p>
+            <a:pPr marL="228600" indent="-228600">
+              <a:buAutoNum type="arabicPeriod"/>
+            </a:pPr>
+            <a:r>
+              <a:rPr lang="fr-CH" dirty="0" smtClean="0"/>
+              <a:t>Utilisant un Framework PHP – après quelques recherches décidé d’utiliser </a:t>
+            </a:r>
+            <a:r>
+              <a:rPr lang="fr-CH" dirty="0" err="1" smtClean="0"/>
+              <a:t>Symfony</a:t>
+            </a:r>
+            <a:endParaRPr lang="fr-CH" dirty="0" smtClean="0"/>
+          </a:p>
+          <a:p>
+            <a:endParaRPr lang="fr-CH" dirty="0" smtClean="0"/>
+          </a:p>
+          <a:p>
+            <a:r>
+              <a:rPr lang="fr-CH" dirty="0" smtClean="0"/>
+              <a:t>Planification est sous format agile, parce que je n’ai eu aucune idée combien de temps chaque tâche peut prendre.</a:t>
+            </a:r>
+          </a:p>
+          <a:p>
+            <a:endParaRPr lang="fr-CH" dirty="0"/>
+          </a:p>
+          <a:p>
+            <a:endParaRPr lang="fr-CH" dirty="0" smtClean="0"/>
           </a:p>
         </p:txBody>
       </p:sp>
@@ -974,7 +971,7 @@
           <a:p>
             <a:fld id="{AF20F4FC-321E-488B-B931-F783E76E6992}" type="slidenum">
               <a:rPr lang="fr-CH" smtClean="0"/>
-              <a:t>10</a:t>
+              <a:t>9</a:t>
             </a:fld>
             <a:endParaRPr lang="fr-CH"/>
           </a:p>
@@ -983,7 +980,7 @@
     </p:spTree>
     <p:extLst>
       <p:ext uri="{BB962C8B-B14F-4D97-AF65-F5344CB8AC3E}">
-        <p14:creationId xmlns:p14="http://schemas.microsoft.com/office/powerpoint/2010/main" val="1716801254"/>
+        <p14:creationId xmlns:p14="http://schemas.microsoft.com/office/powerpoint/2010/main" val="1631050410"/>
       </p:ext>
     </p:extLst>
   </p:cSld>
@@ -1037,7 +1034,7 @@
           <a:bodyPr/>
           <a:lstStyle/>
           <a:p>
-            <a:endParaRPr lang="fr-CH"/>
+            <a:endParaRPr lang="fr-CH" dirty="0"/>
           </a:p>
         </p:txBody>
       </p:sp>
@@ -1058,259 +1055,7 @@
           <a:p>
             <a:fld id="{AF20F4FC-321E-488B-B931-F783E76E6992}" type="slidenum">
               <a:rPr lang="fr-CH" smtClean="0"/>
-              <a:t>11</a:t>
-            </a:fld>
-            <a:endParaRPr lang="fr-CH"/>
-          </a:p>
-        </p:txBody>
-      </p:sp>
-    </p:spTree>
-    <p:extLst>
-      <p:ext uri="{BB962C8B-B14F-4D97-AF65-F5344CB8AC3E}">
-        <p14:creationId xmlns:p14="http://schemas.microsoft.com/office/powerpoint/2010/main" val="542390362"/>
-      </p:ext>
-    </p:extLst>
-  </p:cSld>
-  <p:clrMapOvr>
-    <a:masterClrMapping/>
-  </p:clrMapOvr>
-</p:notes>
-</file>
-
-<file path=ppt/notesSlides/notesSlide6.xml><?xml version="1.0" encoding="utf-8"?>
-<p:notes xmlns:a="http://schemas.openxmlformats.org/drawingml/2006/main" xmlns:r="http://schemas.openxmlformats.org/officeDocument/2006/relationships" xmlns:p="http://schemas.openxmlformats.org/presentationml/2006/main">
-  <p:cSld>
-    <p:spTree>
-      <p:nvGrpSpPr>
-        <p:cNvPr id="1" name=""/>
-        <p:cNvGrpSpPr/>
-        <p:nvPr/>
-      </p:nvGrpSpPr>
-      <p:grpSpPr>
-        <a:xfrm>
-          <a:off x="0" y="0"/>
-          <a:ext cx="0" cy="0"/>
-          <a:chOff x="0" y="0"/>
-          <a:chExt cx="0" cy="0"/>
-        </a:xfrm>
-      </p:grpSpPr>
-      <p:sp>
-        <p:nvSpPr>
-          <p:cNvPr id="2" name="Espace réservé de l'image des diapositives 1"/>
-          <p:cNvSpPr>
-            <a:spLocks noGrp="1" noRot="1" noChangeAspect="1"/>
-          </p:cNvSpPr>
-          <p:nvPr>
-            <p:ph type="sldImg"/>
-          </p:nvPr>
-        </p:nvSpPr>
-        <p:spPr/>
-      </p:sp>
-      <p:sp>
-        <p:nvSpPr>
-          <p:cNvPr id="3" name="Espace réservé des notes 2"/>
-          <p:cNvSpPr>
-            <a:spLocks noGrp="1"/>
-          </p:cNvSpPr>
-          <p:nvPr>
-            <p:ph type="body" idx="1"/>
-          </p:nvPr>
-        </p:nvSpPr>
-        <p:spPr/>
-        <p:txBody>
-          <a:bodyPr/>
-          <a:lstStyle/>
-          <a:p>
-            <a:endParaRPr lang="fr-CH"/>
-          </a:p>
-        </p:txBody>
-      </p:sp>
-      <p:sp>
-        <p:nvSpPr>
-          <p:cNvPr id="4" name="Espace réservé du numéro de diapositive 3"/>
-          <p:cNvSpPr>
-            <a:spLocks noGrp="1"/>
-          </p:cNvSpPr>
-          <p:nvPr>
-            <p:ph type="sldNum" sz="quarter" idx="10"/>
-          </p:nvPr>
-        </p:nvSpPr>
-        <p:spPr/>
-        <p:txBody>
-          <a:bodyPr/>
-          <a:lstStyle/>
-          <a:p>
-            <a:fld id="{AF20F4FC-321E-488B-B931-F783E76E6992}" type="slidenum">
-              <a:rPr lang="fr-CH" smtClean="0"/>
-              <a:t>12</a:t>
-            </a:fld>
-            <a:endParaRPr lang="fr-CH"/>
-          </a:p>
-        </p:txBody>
-      </p:sp>
-    </p:spTree>
-    <p:extLst>
-      <p:ext uri="{BB962C8B-B14F-4D97-AF65-F5344CB8AC3E}">
-        <p14:creationId xmlns:p14="http://schemas.microsoft.com/office/powerpoint/2010/main" val="3816534591"/>
-      </p:ext>
-    </p:extLst>
-  </p:cSld>
-  <p:clrMapOvr>
-    <a:masterClrMapping/>
-  </p:clrMapOvr>
-</p:notes>
-</file>
-
-<file path=ppt/notesSlides/notesSlide7.xml><?xml version="1.0" encoding="utf-8"?>
-<p:notes xmlns:a="http://schemas.openxmlformats.org/drawingml/2006/main" xmlns:r="http://schemas.openxmlformats.org/officeDocument/2006/relationships" xmlns:p="http://schemas.openxmlformats.org/presentationml/2006/main">
-  <p:cSld>
-    <p:spTree>
-      <p:nvGrpSpPr>
-        <p:cNvPr id="1" name=""/>
-        <p:cNvGrpSpPr/>
-        <p:nvPr/>
-      </p:nvGrpSpPr>
-      <p:grpSpPr>
-        <a:xfrm>
-          <a:off x="0" y="0"/>
-          <a:ext cx="0" cy="0"/>
-          <a:chOff x="0" y="0"/>
-          <a:chExt cx="0" cy="0"/>
-        </a:xfrm>
-      </p:grpSpPr>
-      <p:sp>
-        <p:nvSpPr>
-          <p:cNvPr id="2" name="Espace réservé de l'image des diapositives 1"/>
-          <p:cNvSpPr>
-            <a:spLocks noGrp="1" noRot="1" noChangeAspect="1"/>
-          </p:cNvSpPr>
-          <p:nvPr>
-            <p:ph type="sldImg"/>
-          </p:nvPr>
-        </p:nvSpPr>
-        <p:spPr/>
-      </p:sp>
-      <p:sp>
-        <p:nvSpPr>
-          <p:cNvPr id="3" name="Espace réservé des notes 2"/>
-          <p:cNvSpPr>
-            <a:spLocks noGrp="1"/>
-          </p:cNvSpPr>
-          <p:nvPr>
-            <p:ph type="body" idx="1"/>
-          </p:nvPr>
-        </p:nvSpPr>
-        <p:spPr/>
-        <p:txBody>
-          <a:bodyPr/>
-          <a:lstStyle/>
-          <a:p>
-            <a:endParaRPr lang="fr-CH"/>
-          </a:p>
-        </p:txBody>
-      </p:sp>
-      <p:sp>
-        <p:nvSpPr>
-          <p:cNvPr id="4" name="Espace réservé du numéro de diapositive 3"/>
-          <p:cNvSpPr>
-            <a:spLocks noGrp="1"/>
-          </p:cNvSpPr>
-          <p:nvPr>
-            <p:ph type="sldNum" sz="quarter" idx="10"/>
-          </p:nvPr>
-        </p:nvSpPr>
-        <p:spPr/>
-        <p:txBody>
-          <a:bodyPr/>
-          <a:lstStyle/>
-          <a:p>
-            <a:fld id="{AF20F4FC-321E-488B-B931-F783E76E6992}" type="slidenum">
-              <a:rPr lang="fr-CH" smtClean="0"/>
-              <a:t>13</a:t>
-            </a:fld>
-            <a:endParaRPr lang="fr-CH"/>
-          </a:p>
-        </p:txBody>
-      </p:sp>
-    </p:spTree>
-    <p:extLst>
-      <p:ext uri="{BB962C8B-B14F-4D97-AF65-F5344CB8AC3E}">
-        <p14:creationId xmlns:p14="http://schemas.microsoft.com/office/powerpoint/2010/main" val="327721688"/>
-      </p:ext>
-    </p:extLst>
-  </p:cSld>
-  <p:clrMapOvr>
-    <a:masterClrMapping/>
-  </p:clrMapOvr>
-</p:notes>
-</file>
-
-<file path=ppt/notesSlides/notesSlide8.xml><?xml version="1.0" encoding="utf-8"?>
-<p:notes xmlns:a="http://schemas.openxmlformats.org/drawingml/2006/main" xmlns:r="http://schemas.openxmlformats.org/officeDocument/2006/relationships" xmlns:p="http://schemas.openxmlformats.org/presentationml/2006/main">
-  <p:cSld>
-    <p:spTree>
-      <p:nvGrpSpPr>
-        <p:cNvPr id="1" name=""/>
-        <p:cNvGrpSpPr/>
-        <p:nvPr/>
-      </p:nvGrpSpPr>
-      <p:grpSpPr>
-        <a:xfrm>
-          <a:off x="0" y="0"/>
-          <a:ext cx="0" cy="0"/>
-          <a:chOff x="0" y="0"/>
-          <a:chExt cx="0" cy="0"/>
-        </a:xfrm>
-      </p:grpSpPr>
-      <p:sp>
-        <p:nvSpPr>
-          <p:cNvPr id="2" name="Espace réservé de l'image des diapositives 1"/>
-          <p:cNvSpPr>
-            <a:spLocks noGrp="1" noRot="1" noChangeAspect="1"/>
-          </p:cNvSpPr>
-          <p:nvPr>
-            <p:ph type="sldImg"/>
-          </p:nvPr>
-        </p:nvSpPr>
-        <p:spPr/>
-      </p:sp>
-      <p:sp>
-        <p:nvSpPr>
-          <p:cNvPr id="3" name="Espace réservé des notes 2"/>
-          <p:cNvSpPr>
-            <a:spLocks noGrp="1"/>
-          </p:cNvSpPr>
-          <p:nvPr>
-            <p:ph type="body" idx="1"/>
-          </p:nvPr>
-        </p:nvSpPr>
-        <p:spPr/>
-        <p:txBody>
-          <a:bodyPr/>
-          <a:lstStyle/>
-          <a:p>
-            <a:endParaRPr lang="fr-CH" dirty="0"/>
-          </a:p>
-        </p:txBody>
-      </p:sp>
-      <p:sp>
-        <p:nvSpPr>
-          <p:cNvPr id="4" name="Espace réservé du numéro de diapositive 3"/>
-          <p:cNvSpPr>
-            <a:spLocks noGrp="1"/>
-          </p:cNvSpPr>
-          <p:nvPr>
-            <p:ph type="sldNum" sz="quarter" idx="10"/>
-          </p:nvPr>
-        </p:nvSpPr>
-        <p:spPr/>
-        <p:txBody>
-          <a:bodyPr/>
-          <a:lstStyle/>
-          <a:p>
-            <a:fld id="{AF20F4FC-321E-488B-B931-F783E76E6992}" type="slidenum">
-              <a:rPr lang="fr-CH" smtClean="0"/>
-              <a:t>14</a:t>
+              <a:t>10</a:t>
             </a:fld>
             <a:endParaRPr lang="fr-CH"/>
           </a:p>
@@ -1424,7 +1169,7 @@
           <a:effectLst/>
           <a:extLst>
             <a:ext uri="{91240B29-F687-4f45-9708-019B960494DF}">
-              <a14:hiddenLine xmlns:a14="http://schemas.microsoft.com/office/drawing/2010/main" xmlns="" w="9525">
+              <a14:hiddenLine xmlns="" xmlns:a14="http://schemas.microsoft.com/office/drawing/2010/main" w="9525">
                 <a:solidFill>
                   <a:srgbClr val="000000"/>
                 </a:solidFill>
@@ -1617,7 +1362,7 @@
             <a:fld id="{08B9EBBA-996F-894A-B54A-D6246ED52CEA}" type="datetimeFigureOut">
               <a:rPr lang="en-US" dirty="0"/>
               <a:pPr/>
-              <a:t>1/9/2020</a:t>
+              <a:t>1/24/2020</a:t>
             </a:fld>
             <a:endParaRPr lang="en-US" dirty="0"/>
           </a:p>
@@ -1932,7 +1677,7 @@
             <a:fld id="{18C79C5D-2A6F-F04D-97DA-BEF2467B64E4}" type="datetimeFigureOut">
               <a:rPr lang="en-US" dirty="0"/>
               <a:pPr/>
-              <a:t>1/9/2020</a:t>
+              <a:t>1/24/2020</a:t>
             </a:fld>
             <a:endParaRPr lang="en-US" dirty="0"/>
           </a:p>
@@ -2417,7 +2162,7 @@
             <a:fld id="{8DFA1846-DA80-1C48-A609-854EA85C59AD}" type="datetimeFigureOut">
               <a:rPr lang="en-US" dirty="0"/>
               <a:pPr/>
-              <a:t>1/9/2020</a:t>
+              <a:t>1/24/2020</a:t>
             </a:fld>
             <a:endParaRPr lang="en-US" dirty="0"/>
           </a:p>
@@ -2783,7 +2528,7 @@
             <a:fld id="{FBF54567-0DE4-3F47-BF90-CB84690072F9}" type="datetimeFigureOut">
               <a:rPr lang="en-US" dirty="0"/>
               <a:pPr/>
-              <a:t>1/9/2020</a:t>
+              <a:t>1/24/2020</a:t>
             </a:fld>
             <a:endParaRPr lang="en-US" dirty="0"/>
           </a:p>
@@ -2934,7 +2679,7 @@
           <a:ln/>
           <a:extLst>
             <a:ext uri="{91240B29-F687-4f45-9708-019B960494DF}">
-              <a14:hiddenLine xmlns:a14="http://schemas.microsoft.com/office/drawing/2010/main" xmlns="" w="9525">
+              <a14:hiddenLine xmlns="" xmlns:a14="http://schemas.microsoft.com/office/drawing/2010/main" w="9525">
                 <a:solidFill>
                   <a:srgbClr val="000000"/>
                 </a:solidFill>
@@ -3053,7 +2798,7 @@
             <a:fld id="{C6C52C72-DE31-F449-A4ED-4C594FD91407}" type="datetimeFigureOut">
               <a:rPr lang="en-US" dirty="0"/>
               <a:pPr/>
-              <a:t>1/9/2020</a:t>
+              <a:t>1/24/2020</a:t>
             </a:fld>
             <a:endParaRPr lang="en-US" dirty="0"/>
           </a:p>
@@ -3206,7 +2951,7 @@
           <a:ln/>
           <a:extLst>
             <a:ext uri="{91240B29-F687-4f45-9708-019B960494DF}">
-              <a14:hiddenLine xmlns:a14="http://schemas.microsoft.com/office/drawing/2010/main" xmlns="" w="9525">
+              <a14:hiddenLine xmlns="" xmlns:a14="http://schemas.microsoft.com/office/drawing/2010/main" w="9525">
                 <a:solidFill>
                   <a:srgbClr val="000000"/>
                 </a:solidFill>
@@ -3335,7 +3080,7 @@
             <a:fld id="{ED62726E-379B-B349-9EED-81ED093FA806}" type="datetimeFigureOut">
               <a:rPr lang="en-US" dirty="0"/>
               <a:pPr/>
-              <a:t>1/9/2020</a:t>
+              <a:t>1/24/2020</a:t>
             </a:fld>
             <a:endParaRPr lang="en-US" dirty="0"/>
           </a:p>
@@ -3486,7 +3231,7 @@
           <a:ln/>
           <a:extLst>
             <a:ext uri="{91240B29-F687-4f45-9708-019B960494DF}">
-              <a14:hiddenLine xmlns:a14="http://schemas.microsoft.com/office/drawing/2010/main" xmlns="" w="9525">
+              <a14:hiddenLine xmlns="" xmlns:a14="http://schemas.microsoft.com/office/drawing/2010/main" w="9525">
                 <a:solidFill>
                   <a:srgbClr val="000000"/>
                 </a:solidFill>
@@ -3615,7 +3360,7 @@
             <a:fld id="{9B3A1323-8D79-1946-B0D7-40001CF92E9D}" type="datetimeFigureOut">
               <a:rPr lang="en-US" dirty="0"/>
               <a:pPr/>
-              <a:t>1/9/2020</a:t>
+              <a:t>1/24/2020</a:t>
             </a:fld>
             <a:endParaRPr lang="en-US" dirty="0"/>
           </a:p>
@@ -3955,7 +3700,7 @@
             <a:fld id="{8DFA1846-DA80-1C48-A609-854EA85C59AD}" type="datetimeFigureOut">
               <a:rPr lang="en-US" dirty="0"/>
               <a:pPr/>
-              <a:t>1/9/2020</a:t>
+              <a:t>1/24/2020</a:t>
             </a:fld>
             <a:endParaRPr lang="en-US" dirty="0"/>
           </a:p>
@@ -4106,7 +3851,7 @@
           <a:ln/>
           <a:extLst>
             <a:ext uri="{91240B29-F687-4f45-9708-019B960494DF}">
-              <a14:hiddenLine xmlns:a14="http://schemas.microsoft.com/office/drawing/2010/main" xmlns="" w="9525">
+              <a14:hiddenLine xmlns="" xmlns:a14="http://schemas.microsoft.com/office/drawing/2010/main" w="9525">
                 <a:solidFill>
                   <a:srgbClr val="000000"/>
                 </a:solidFill>
@@ -4291,7 +4036,7 @@
             <a:fld id="{57302355-E14B-8545-A8F8-0FE83CC9D524}" type="datetimeFigureOut">
               <a:rPr lang="en-US" dirty="0"/>
               <a:pPr/>
-              <a:t>1/9/2020</a:t>
+              <a:t>1/24/2020</a:t>
             </a:fld>
             <a:endParaRPr lang="en-US" dirty="0"/>
           </a:p>
@@ -4442,7 +4187,7 @@
           <a:ln/>
           <a:extLst>
             <a:ext uri="{91240B29-F687-4f45-9708-019B960494DF}">
-              <a14:hiddenLine xmlns:a14="http://schemas.microsoft.com/office/drawing/2010/main" xmlns="" w="9525">
+              <a14:hiddenLine xmlns="" xmlns:a14="http://schemas.microsoft.com/office/drawing/2010/main" w="9525">
                 <a:solidFill>
                   <a:srgbClr val="000000"/>
                 </a:solidFill>
@@ -4765,7 +4510,7 @@
             <a:fld id="{02640F58-564D-2B4F-AE67-E407BA4FCF45}" type="datetimeFigureOut">
               <a:rPr lang="en-US" dirty="0"/>
               <a:pPr/>
-              <a:t>1/9/2020</a:t>
+              <a:t>1/24/2020</a:t>
             </a:fld>
             <a:endParaRPr lang="en-US" dirty="0"/>
           </a:p>
@@ -4916,7 +4661,7 @@
           <a:ln/>
           <a:extLst>
             <a:ext uri="{91240B29-F687-4f45-9708-019B960494DF}">
-              <a14:hiddenLine xmlns:a14="http://schemas.microsoft.com/office/drawing/2010/main" xmlns="" w="9525">
+              <a14:hiddenLine xmlns="" xmlns:a14="http://schemas.microsoft.com/office/drawing/2010/main" w="9525">
                 <a:solidFill>
                   <a:srgbClr val="000000"/>
                 </a:solidFill>
@@ -4983,7 +4728,7 @@
             <a:fld id="{F13A34C8-038E-2045-AF43-DF7DBB8E0E9E}" type="datetimeFigureOut">
               <a:rPr lang="en-US" dirty="0"/>
               <a:pPr/>
-              <a:t>1/9/2020</a:t>
+              <a:t>1/24/2020</a:t>
             </a:fld>
             <a:endParaRPr lang="en-US" dirty="0"/>
           </a:p>
@@ -5075,7 +4820,7 @@
             <a:fld id="{8818C68F-D26B-8F47-958C-23B49CF8A634}" type="datetimeFigureOut">
               <a:rPr lang="en-US" dirty="0"/>
               <a:pPr/>
-              <a:t>1/9/2020</a:t>
+              <a:t>1/24/2020</a:t>
             </a:fld>
             <a:endParaRPr lang="en-US" dirty="0"/>
           </a:p>
@@ -5339,7 +5084,7 @@
           <a:ln/>
           <a:extLst>
             <a:ext uri="{91240B29-F687-4f45-9708-019B960494DF}">
-              <a14:hiddenLine xmlns:a14="http://schemas.microsoft.com/office/drawing/2010/main" xmlns="" w="9525">
+              <a14:hiddenLine xmlns="" xmlns:a14="http://schemas.microsoft.com/office/drawing/2010/main" w="9525">
                 <a:solidFill>
                   <a:srgbClr val="000000"/>
                 </a:solidFill>
@@ -5539,7 +5284,7 @@
             <a:fld id="{D0DF5E60-9974-AC48-9591-99C2BB44B7CF}" type="datetimeFigureOut">
               <a:rPr lang="en-US" dirty="0"/>
               <a:pPr/>
-              <a:t>1/9/2020</a:t>
+              <a:t>1/24/2020</a:t>
             </a:fld>
             <a:endParaRPr lang="en-US" dirty="0"/>
           </a:p>
@@ -5849,7 +5594,7 @@
             <a:fld id="{18C79C5D-2A6F-F04D-97DA-BEF2467B64E4}" type="datetimeFigureOut">
               <a:rPr lang="en-US" dirty="0"/>
               <a:pPr/>
-              <a:t>1/9/2020</a:t>
+              <a:t>1/24/2020</a:t>
             </a:fld>
             <a:endParaRPr lang="en-US" dirty="0"/>
           </a:p>
@@ -6116,7 +5861,7 @@
             <a:fld id="{09B482E8-6E0E-1B4F-B1FD-C69DB9E858D9}" type="datetimeFigureOut">
               <a:rPr lang="en-US" dirty="0"/>
               <a:pPr/>
-              <a:t>1/9/2020</a:t>
+              <a:t>1/24/2020</a:t>
             </a:fld>
             <a:endParaRPr lang="en-US" dirty="0"/>
           </a:p>
@@ -6676,47 +6421,87 @@
           <a:lstStyle/>
           <a:p>
             <a:r>
-              <a:rPr lang="fr-CH" dirty="0" err="1" smtClean="0"/>
-              <a:t>Mockups</a:t>
+              <a:rPr lang="fr-CH" dirty="0" smtClean="0"/>
+              <a:t>Réalisation</a:t>
             </a:r>
             <a:endParaRPr lang="fr-CH" dirty="0"/>
           </a:p>
         </p:txBody>
       </p:sp>
-      <p:pic>
-        <p:nvPicPr>
-          <p:cNvPr id="5" name="Image 4"/>
-          <p:cNvPicPr>
-            <a:picLocks noChangeAspect="1"/>
-          </p:cNvPicPr>
-          <p:nvPr/>
-        </p:nvPicPr>
-        <p:blipFill>
-          <a:blip r:embed="rId3">
-            <a:extLst>
-              <a:ext uri="{28A0092B-C50C-407E-A947-70E740481C1C}">
-                <a14:useLocalDpi xmlns:a14="http://schemas.microsoft.com/office/drawing/2010/main" val="0"/>
-              </a:ext>
-            </a:extLst>
-          </a:blip>
-          <a:stretch>
-            <a:fillRect/>
-          </a:stretch>
-        </p:blipFill>
+      <p:sp>
+        <p:nvSpPr>
+          <p:cNvPr id="4" name="Espace réservé du contenu 2"/>
+          <p:cNvSpPr>
+            <a:spLocks noGrp="1"/>
+          </p:cNvSpPr>
+          <p:nvPr>
+            <p:ph idx="1"/>
+          </p:nvPr>
+        </p:nvSpPr>
         <p:spPr>
           <a:xfrm>
-            <a:off x="6712496" y="447188"/>
-            <a:ext cx="4789693" cy="6002058"/>
+            <a:off x="827424" y="2302497"/>
+            <a:ext cx="10554574" cy="3636511"/>
           </a:xfrm>
-          <a:prstGeom prst="rect">
-            <a:avLst/>
-          </a:prstGeom>
         </p:spPr>
-      </p:pic>
+        <p:txBody>
+          <a:bodyPr/>
+          <a:lstStyle/>
+          <a:p>
+            <a:pPr marL="0" indent="0" algn="ctr">
+              <a:buNone/>
+            </a:pPr>
+            <a:endParaRPr lang="fr-CH" sz="4400" dirty="0" smtClean="0"/>
+          </a:p>
+          <a:p>
+            <a:pPr marL="0" indent="0" algn="ctr">
+              <a:buNone/>
+            </a:pPr>
+            <a:r>
+              <a:rPr lang="fr-CH" sz="4400" dirty="0" smtClean="0"/>
+              <a:t>Utilisation des composants PHP</a:t>
+            </a:r>
+          </a:p>
+          <a:p>
+            <a:pPr marL="0" indent="0" algn="ctr">
+              <a:buNone/>
+            </a:pPr>
+            <a:r>
+              <a:rPr lang="fr-CH" sz="4400" dirty="0" smtClean="0"/>
+              <a:t>Avantages de </a:t>
+            </a:r>
+            <a:r>
+              <a:rPr lang="fr-CH" sz="4400" dirty="0" err="1" smtClean="0"/>
+              <a:t>Symfony</a:t>
+            </a:r>
+            <a:endParaRPr lang="fr-CH" sz="4400" dirty="0" smtClean="0"/>
+          </a:p>
+          <a:p>
+            <a:pPr marL="0" indent="0" algn="ctr">
+              <a:buNone/>
+            </a:pPr>
+            <a:r>
+              <a:rPr lang="fr-CH" sz="4400" dirty="0" smtClean="0"/>
+              <a:t>Inconvénients de </a:t>
+            </a:r>
+            <a:r>
+              <a:rPr lang="fr-CH" sz="4400" dirty="0" err="1" smtClean="0"/>
+              <a:t>Symfony</a:t>
+            </a:r>
+            <a:endParaRPr lang="fr-CH" sz="4400" dirty="0" smtClean="0"/>
+          </a:p>
+          <a:p>
+            <a:endParaRPr lang="fr-CH" dirty="0" smtClean="0"/>
+          </a:p>
+          <a:p>
+            <a:endParaRPr lang="fr-CH" dirty="0"/>
+          </a:p>
+        </p:txBody>
+      </p:sp>
     </p:spTree>
     <p:extLst>
       <p:ext uri="{BB962C8B-B14F-4D97-AF65-F5344CB8AC3E}">
-        <p14:creationId xmlns:p14="http://schemas.microsoft.com/office/powerpoint/2010/main" val="279994138"/>
+        <p14:creationId xmlns:p14="http://schemas.microsoft.com/office/powerpoint/2010/main" val="2089527888"/>
       </p:ext>
     </p:extLst>
   </p:cSld>
@@ -6766,8 +6551,12 @@
           <a:lstStyle/>
           <a:p>
             <a:r>
-              <a:rPr lang="fr-CH" dirty="0" err="1" smtClean="0"/>
-              <a:t>Mockups</a:t>
+              <a:rPr lang="fr-CH" dirty="0" smtClean="0"/>
+              <a:t>Design des </a:t>
+            </a:r>
+            <a:r>
+              <a:rPr lang="fr-CH" dirty="0" smtClean="0"/>
+              <a:t>pages</a:t>
             </a:r>
             <a:endParaRPr lang="fr-CH" dirty="0"/>
           </a:p>
@@ -6782,21 +6571,63 @@
           <p:nvPr/>
         </p:nvPicPr>
         <p:blipFill>
-          <a:blip r:embed="rId3">
-            <a:extLst>
-              <a:ext uri="{28A0092B-C50C-407E-A947-70E740481C1C}">
-                <a14:useLocalDpi xmlns:a14="http://schemas.microsoft.com/office/drawing/2010/main" val="0"/>
-              </a:ext>
-            </a:extLst>
-          </a:blip>
+          <a:blip r:embed="rId2"/>
           <a:stretch>
             <a:fillRect/>
           </a:stretch>
         </p:blipFill>
         <p:spPr>
           <a:xfrm>
-            <a:off x="6977580" y="447188"/>
-            <a:ext cx="4259524" cy="6002058"/>
+            <a:off x="9424986" y="1947621"/>
+            <a:ext cx="2699280" cy="2562467"/>
+          </a:xfrm>
+          <a:prstGeom prst="rect">
+            <a:avLst/>
+          </a:prstGeom>
+        </p:spPr>
+      </p:pic>
+      <p:pic>
+        <p:nvPicPr>
+          <p:cNvPr id="6" name="Image 5"/>
+          <p:cNvPicPr>
+            <a:picLocks noChangeAspect="1"/>
+          </p:cNvPicPr>
+          <p:nvPr/>
+        </p:nvPicPr>
+        <p:blipFill>
+          <a:blip r:embed="rId3"/>
+          <a:stretch>
+            <a:fillRect/>
+          </a:stretch>
+        </p:blipFill>
+        <p:spPr>
+          <a:xfrm>
+            <a:off x="4334387" y="1947621"/>
+            <a:ext cx="4993102" cy="2982104"/>
+          </a:xfrm>
+          <a:prstGeom prst="rect">
+            <a:avLst/>
+          </a:prstGeom>
+        </p:spPr>
+      </p:pic>
+      <p:pic>
+        <p:nvPicPr>
+          <p:cNvPr id="3" name="Image 2"/>
+          <p:cNvPicPr>
+            <a:picLocks noChangeAspect="1"/>
+          </p:cNvPicPr>
+          <p:nvPr/>
+        </p:nvPicPr>
+        <p:blipFill>
+          <a:blip r:embed="rId4"/>
+          <a:stretch>
+            <a:fillRect/>
+          </a:stretch>
+        </p:blipFill>
+        <p:spPr>
+          <a:xfrm>
+            <a:off x="0" y="1947621"/>
+            <a:ext cx="4236890" cy="3230543"/>
           </a:xfrm>
           <a:prstGeom prst="rect">
             <a:avLst/>
@@ -6806,7 +6637,7 @@
     </p:spTree>
     <p:extLst>
       <p:ext uri="{BB962C8B-B14F-4D97-AF65-F5344CB8AC3E}">
-        <p14:creationId xmlns:p14="http://schemas.microsoft.com/office/powerpoint/2010/main" val="2661294483"/>
+        <p14:creationId xmlns:p14="http://schemas.microsoft.com/office/powerpoint/2010/main" val="3114747950"/>
       </p:ext>
     </p:extLst>
   </p:cSld>
@@ -6856,320 +6687,9 @@
           <a:lstStyle/>
           <a:p>
             <a:r>
-              <a:rPr lang="fr-CH" dirty="0" err="1" smtClean="0"/>
-              <a:t>Mockups</a:t>
-            </a:r>
-            <a:endParaRPr lang="fr-CH" dirty="0"/>
-          </a:p>
-        </p:txBody>
-      </p:sp>
-      <p:pic>
-        <p:nvPicPr>
-          <p:cNvPr id="5" name="Image 4"/>
-          <p:cNvPicPr>
-            <a:picLocks noChangeAspect="1"/>
-          </p:cNvPicPr>
-          <p:nvPr/>
-        </p:nvPicPr>
-        <p:blipFill>
-          <a:blip r:embed="rId3">
-            <a:extLst>
-              <a:ext uri="{28A0092B-C50C-407E-A947-70E740481C1C}">
-                <a14:useLocalDpi xmlns:a14="http://schemas.microsoft.com/office/drawing/2010/main" val="0"/>
-              </a:ext>
-            </a:extLst>
-          </a:blip>
-          <a:stretch>
-            <a:fillRect/>
-          </a:stretch>
-        </p:blipFill>
-        <p:spPr>
-          <a:xfrm>
-            <a:off x="7032831" y="447188"/>
-            <a:ext cx="4149023" cy="6002058"/>
-          </a:xfrm>
-          <a:prstGeom prst="rect">
-            <a:avLst/>
-          </a:prstGeom>
-        </p:spPr>
-      </p:pic>
-    </p:spTree>
-    <p:extLst>
-      <p:ext uri="{BB962C8B-B14F-4D97-AF65-F5344CB8AC3E}">
-        <p14:creationId xmlns:p14="http://schemas.microsoft.com/office/powerpoint/2010/main" val="1588643794"/>
-      </p:ext>
-    </p:extLst>
-  </p:cSld>
-  <p:clrMapOvr>
-    <a:masterClrMapping/>
-  </p:clrMapOvr>
-  <p:timing>
-    <p:tnLst>
-      <p:par>
-        <p:cTn id="1" dur="indefinite" restart="never" nodeType="tmRoot"/>
-      </p:par>
-    </p:tnLst>
-  </p:timing>
-</p:sld>
-</file>
-
-<file path=ppt/slides/slide13.xml><?xml version="1.0" encoding="utf-8"?>
-<p:sld xmlns:a="http://schemas.openxmlformats.org/drawingml/2006/main" xmlns:r="http://schemas.openxmlformats.org/officeDocument/2006/relationships" xmlns:p="http://schemas.openxmlformats.org/presentationml/2006/main">
-  <p:cSld>
-    <p:spTree>
-      <p:nvGrpSpPr>
-        <p:cNvPr id="1" name=""/>
-        <p:cNvGrpSpPr/>
-        <p:nvPr/>
-      </p:nvGrpSpPr>
-      <p:grpSpPr>
-        <a:xfrm>
-          <a:off x="0" y="0"/>
-          <a:ext cx="0" cy="0"/>
-          <a:chOff x="0" y="0"/>
-          <a:chExt cx="0" cy="0"/>
-        </a:xfrm>
-      </p:grpSpPr>
-      <p:sp>
-        <p:nvSpPr>
-          <p:cNvPr id="2" name="Titre 1"/>
-          <p:cNvSpPr>
-            <a:spLocks noGrp="1"/>
-          </p:cNvSpPr>
-          <p:nvPr>
-            <p:ph type="title"/>
-          </p:nvPr>
-        </p:nvSpPr>
-        <p:spPr/>
-        <p:txBody>
-          <a:bodyPr/>
-          <a:lstStyle/>
-          <a:p>
-            <a:r>
-              <a:rPr lang="fr-CH" dirty="0" err="1" smtClean="0"/>
-              <a:t>Mockups</a:t>
-            </a:r>
-            <a:endParaRPr lang="fr-CH" dirty="0"/>
-          </a:p>
-        </p:txBody>
-      </p:sp>
-      <p:pic>
-        <p:nvPicPr>
-          <p:cNvPr id="5" name="Image 4"/>
-          <p:cNvPicPr>
-            <a:picLocks noChangeAspect="1"/>
-          </p:cNvPicPr>
-          <p:nvPr/>
-        </p:nvPicPr>
-        <p:blipFill>
-          <a:blip r:embed="rId3">
-            <a:extLst>
-              <a:ext uri="{28A0092B-C50C-407E-A947-70E740481C1C}">
-                <a14:useLocalDpi xmlns:a14="http://schemas.microsoft.com/office/drawing/2010/main" val="0"/>
-              </a:ext>
-            </a:extLst>
-          </a:blip>
-          <a:stretch>
-            <a:fillRect/>
-          </a:stretch>
-        </p:blipFill>
-        <p:spPr>
-          <a:xfrm>
-            <a:off x="7228732" y="447188"/>
-            <a:ext cx="3757220" cy="6002058"/>
-          </a:xfrm>
-          <a:prstGeom prst="rect">
-            <a:avLst/>
-          </a:prstGeom>
-        </p:spPr>
-      </p:pic>
-    </p:spTree>
-    <p:extLst>
-      <p:ext uri="{BB962C8B-B14F-4D97-AF65-F5344CB8AC3E}">
-        <p14:creationId xmlns:p14="http://schemas.microsoft.com/office/powerpoint/2010/main" val="4169131415"/>
-      </p:ext>
-    </p:extLst>
-  </p:cSld>
-  <p:clrMapOvr>
-    <a:masterClrMapping/>
-  </p:clrMapOvr>
-  <p:timing>
-    <p:tnLst>
-      <p:par>
-        <p:cTn id="1" dur="indefinite" restart="never" nodeType="tmRoot"/>
-      </p:par>
-    </p:tnLst>
-  </p:timing>
-</p:sld>
-</file>
-
-<file path=ppt/slides/slide14.xml><?xml version="1.0" encoding="utf-8"?>
-<p:sld xmlns:a="http://schemas.openxmlformats.org/drawingml/2006/main" xmlns:r="http://schemas.openxmlformats.org/officeDocument/2006/relationships" xmlns:p="http://schemas.openxmlformats.org/presentationml/2006/main">
-  <p:cSld>
-    <p:spTree>
-      <p:nvGrpSpPr>
-        <p:cNvPr id="1" name=""/>
-        <p:cNvGrpSpPr/>
-        <p:nvPr/>
-      </p:nvGrpSpPr>
-      <p:grpSpPr>
-        <a:xfrm>
-          <a:off x="0" y="0"/>
-          <a:ext cx="0" cy="0"/>
-          <a:chOff x="0" y="0"/>
-          <a:chExt cx="0" cy="0"/>
-        </a:xfrm>
-      </p:grpSpPr>
-      <p:sp>
-        <p:nvSpPr>
-          <p:cNvPr id="2" name="Titre 1"/>
-          <p:cNvSpPr>
-            <a:spLocks noGrp="1"/>
-          </p:cNvSpPr>
-          <p:nvPr>
-            <p:ph type="title"/>
-          </p:nvPr>
-        </p:nvSpPr>
-        <p:spPr/>
-        <p:txBody>
-          <a:bodyPr/>
-          <a:lstStyle/>
-          <a:p>
-            <a:r>
-              <a:rPr lang="fr-CH" dirty="0" smtClean="0"/>
-              <a:t>Réalisation</a:t>
-            </a:r>
-            <a:endParaRPr lang="fr-CH" dirty="0"/>
-          </a:p>
-        </p:txBody>
-      </p:sp>
-      <p:sp>
-        <p:nvSpPr>
-          <p:cNvPr id="4" name="Espace réservé du contenu 2"/>
-          <p:cNvSpPr>
-            <a:spLocks noGrp="1"/>
-          </p:cNvSpPr>
-          <p:nvPr>
-            <p:ph idx="1"/>
-          </p:nvPr>
-        </p:nvSpPr>
-        <p:spPr>
-          <a:xfrm>
-            <a:off x="827424" y="2302497"/>
-            <a:ext cx="10554574" cy="3636511"/>
-          </a:xfrm>
-        </p:spPr>
-        <p:txBody>
-          <a:bodyPr/>
-          <a:lstStyle/>
-          <a:p>
-            <a:pPr marL="0" indent="0" algn="ctr">
-              <a:buNone/>
-            </a:pPr>
-            <a:endParaRPr lang="fr-CH" sz="4400" dirty="0" smtClean="0"/>
-          </a:p>
-          <a:p>
-            <a:pPr marL="0" indent="0" algn="ctr">
-              <a:buNone/>
-            </a:pPr>
-            <a:r>
-              <a:rPr lang="fr-CH" sz="4400" dirty="0" smtClean="0"/>
-              <a:t>Utilisation des composants PHP</a:t>
-            </a:r>
-          </a:p>
-          <a:p>
-            <a:pPr marL="0" indent="0" algn="ctr">
-              <a:buNone/>
-            </a:pPr>
-            <a:r>
-              <a:rPr lang="fr-CH" sz="4400" dirty="0" smtClean="0"/>
-              <a:t>Avantages de </a:t>
-            </a:r>
-            <a:r>
-              <a:rPr lang="fr-CH" sz="4400" dirty="0" err="1" smtClean="0"/>
-              <a:t>Symfony</a:t>
-            </a:r>
-            <a:endParaRPr lang="fr-CH" sz="4400" dirty="0" smtClean="0"/>
-          </a:p>
-          <a:p>
-            <a:pPr marL="0" indent="0" algn="ctr">
-              <a:buNone/>
-            </a:pPr>
-            <a:r>
-              <a:rPr lang="fr-CH" sz="4400" dirty="0" smtClean="0"/>
-              <a:t>Inconvénients de </a:t>
-            </a:r>
-            <a:r>
-              <a:rPr lang="fr-CH" sz="4400" dirty="0" err="1" smtClean="0"/>
-              <a:t>Symfony</a:t>
-            </a:r>
-            <a:endParaRPr lang="fr-CH" sz="4400" dirty="0" smtClean="0"/>
-          </a:p>
-          <a:p>
-            <a:endParaRPr lang="fr-CH" dirty="0" smtClean="0"/>
-          </a:p>
-          <a:p>
-            <a:endParaRPr lang="fr-CH" dirty="0"/>
-          </a:p>
-        </p:txBody>
-      </p:sp>
-    </p:spTree>
-    <p:extLst>
-      <p:ext uri="{BB962C8B-B14F-4D97-AF65-F5344CB8AC3E}">
-        <p14:creationId xmlns:p14="http://schemas.microsoft.com/office/powerpoint/2010/main" val="2089527888"/>
-      </p:ext>
-    </p:extLst>
-  </p:cSld>
-  <p:clrMapOvr>
-    <a:masterClrMapping/>
-  </p:clrMapOvr>
-  <p:timing>
-    <p:tnLst>
-      <p:par>
-        <p:cTn id="1" dur="indefinite" restart="never" nodeType="tmRoot"/>
-      </p:par>
-    </p:tnLst>
-  </p:timing>
-</p:sld>
-</file>
-
-<file path=ppt/slides/slide15.xml><?xml version="1.0" encoding="utf-8"?>
-<p:sld xmlns:a="http://schemas.openxmlformats.org/drawingml/2006/main" xmlns:r="http://schemas.openxmlformats.org/officeDocument/2006/relationships" xmlns:p="http://schemas.openxmlformats.org/presentationml/2006/main">
-  <p:cSld>
-    <p:spTree>
-      <p:nvGrpSpPr>
-        <p:cNvPr id="1" name=""/>
-        <p:cNvGrpSpPr/>
-        <p:nvPr/>
-      </p:nvGrpSpPr>
-      <p:grpSpPr>
-        <a:xfrm>
-          <a:off x="0" y="0"/>
-          <a:ext cx="0" cy="0"/>
-          <a:chOff x="0" y="0"/>
-          <a:chExt cx="0" cy="0"/>
-        </a:xfrm>
-      </p:grpSpPr>
-      <p:sp>
-        <p:nvSpPr>
-          <p:cNvPr id="2" name="Titre 1"/>
-          <p:cNvSpPr>
-            <a:spLocks noGrp="1"/>
-          </p:cNvSpPr>
-          <p:nvPr>
-            <p:ph type="title"/>
-          </p:nvPr>
-        </p:nvSpPr>
-        <p:spPr/>
-        <p:txBody>
-          <a:bodyPr/>
-          <a:lstStyle/>
-          <a:p>
-            <a:r>
-              <a:rPr lang="fr-CH" dirty="0" smtClean="0"/>
-              <a:t>Exemple du design des pages</a:t>
-            </a:r>
-            <a:endParaRPr lang="fr-CH" dirty="0"/>
+              <a:rPr lang="fr-CH" dirty="0"/>
+              <a:t>Design des pages</a:t>
+            </a:r>
           </a:p>
         </p:txBody>
       </p:sp>
@@ -7189,8 +6709,8 @@
         </p:blipFill>
         <p:spPr>
           <a:xfrm>
-            <a:off x="261938" y="2037347"/>
-            <a:ext cx="5092816" cy="4670759"/>
+            <a:off x="9053706" y="1936866"/>
+            <a:ext cx="3138294" cy="4131425"/>
           </a:xfrm>
           <a:prstGeom prst="rect">
             <a:avLst/>
@@ -7199,7 +6719,7 @@
       </p:pic>
       <p:pic>
         <p:nvPicPr>
-          <p:cNvPr id="5" name="Image 4"/>
+          <p:cNvPr id="6" name="Image 5"/>
           <p:cNvPicPr>
             <a:picLocks noChangeAspect="1"/>
           </p:cNvPicPr>
@@ -7213,8 +6733,32 @@
         </p:blipFill>
         <p:spPr>
           <a:xfrm>
-            <a:off x="5499133" y="2037347"/>
-            <a:ext cx="3749341" cy="3559306"/>
+            <a:off x="0" y="2136371"/>
+            <a:ext cx="5219180" cy="3931920"/>
+          </a:xfrm>
+          <a:prstGeom prst="rect">
+            <a:avLst/>
+          </a:prstGeom>
+        </p:spPr>
+      </p:pic>
+      <p:pic>
+        <p:nvPicPr>
+          <p:cNvPr id="7" name="Image 6"/>
+          <p:cNvPicPr>
+            <a:picLocks noChangeAspect="1"/>
+          </p:cNvPicPr>
+          <p:nvPr/>
+        </p:nvPicPr>
+        <p:blipFill>
+          <a:blip r:embed="rId4"/>
+          <a:stretch>
+            <a:fillRect/>
+          </a:stretch>
+        </p:blipFill>
+        <p:spPr>
+          <a:xfrm>
+            <a:off x="5424775" y="1936866"/>
+            <a:ext cx="3423336" cy="4584123"/>
           </a:xfrm>
           <a:prstGeom prst="rect">
             <a:avLst/>
@@ -7224,24 +6768,17 @@
     </p:spTree>
     <p:extLst>
       <p:ext uri="{BB962C8B-B14F-4D97-AF65-F5344CB8AC3E}">
-        <p14:creationId xmlns:p14="http://schemas.microsoft.com/office/powerpoint/2010/main" val="3114747950"/>
+        <p14:creationId xmlns:p14="http://schemas.microsoft.com/office/powerpoint/2010/main" val="3589799461"/>
       </p:ext>
     </p:extLst>
   </p:cSld>
   <p:clrMapOvr>
     <a:masterClrMapping/>
   </p:clrMapOvr>
-  <p:timing>
-    <p:tnLst>
-      <p:par>
-        <p:cTn id="1" dur="indefinite" restart="never" nodeType="tmRoot"/>
-      </p:par>
-    </p:tnLst>
-  </p:timing>
 </p:sld>
 </file>
 
-<file path=ppt/slides/slide16.xml><?xml version="1.0" encoding="utf-8"?>
+<file path=ppt/slides/slide13.xml><?xml version="1.0" encoding="utf-8"?>
 <p:sld xmlns:a="http://schemas.openxmlformats.org/drawingml/2006/main" xmlns:r="http://schemas.openxmlformats.org/officeDocument/2006/relationships" xmlns:p="http://schemas.openxmlformats.org/presentationml/2006/main">
   <p:cSld>
     <p:spTree>
@@ -7556,17 +7093,9 @@
             </a:pPr>
             <a:r>
               <a:rPr lang="fr-CH" sz="4400" dirty="0" smtClean="0"/>
-              <a:t>Le Client</a:t>
-            </a:r>
-          </a:p>
-          <a:p>
-            <a:pPr marL="0" indent="0" algn="ctr">
-              <a:buNone/>
-            </a:pPr>
-            <a:r>
-              <a:rPr lang="fr-CH" sz="4400" dirty="0" smtClean="0"/>
               <a:t>Fonctionnalités</a:t>
             </a:r>
+            <a:endParaRPr lang="fr-CH" sz="4400" dirty="0" smtClean="0"/>
           </a:p>
           <a:p>
             <a:endParaRPr lang="fr-CH" dirty="0" smtClean="0"/>

</xml_diff>